<commit_message>
Atualização dos artefatos para AC 4
</commit_message>
<xml_diff>
--- a/16. DFD Essencial para cada Capacidade.pptx
+++ b/16. DFD Essencial para cada Capacidade.pptx
@@ -3397,10 +3397,10 @@
       </p:grpSpPr>
       <p:pic>
         <p:nvPicPr>
-          <p:cNvPr id="3" name="Imagem 2">
-            <a:extLst>
-              <a:ext uri="{FF2B5EF4-FFF2-40B4-BE49-F238E27FC236}">
-                <a16:creationId xmlns:a16="http://schemas.microsoft.com/office/drawing/2014/main" id="{97FDBAEC-39CC-4B95-B29D-6150C2F2312D}"/>
+          <p:cNvPr id="4" name="Imagem 3">
+            <a:extLst>
+              <a:ext uri="{FF2B5EF4-FFF2-40B4-BE49-F238E27FC236}">
+                <a16:creationId xmlns:a16="http://schemas.microsoft.com/office/drawing/2014/main" id="{54CAE3E6-7096-46E7-83A8-5839CAF44619}"/>
               </a:ext>
             </a:extLst>
           </p:cNvPr>

</xml_diff>